<commit_message>
Update Seite 7. Versucht einbinden externer JSON-Dateien zu ermöglichen
</commit_message>
<xml_diff>
--- a/Filehost/Mockup.pptx
+++ b/Filehost/Mockup.pptx
@@ -5719,7 +5719,7 @@
                     <a:schemeClr val="tx1"/>
                   </a:solidFill>
                 </a:rPr>
-                <a:t>Name	Datum	Teilen von</a:t>
+                <a:t>Name	Datum	Geteilt von</a:t>
               </a:r>
             </a:p>
           </p:txBody>
@@ -5893,7 +5893,7 @@
                 <a:t>Top 10 Anime battles.mp4	24.10.2017	</a:t>
               </a:r>
               <a:r>
-                <a:rPr lang="de-DE">
+                <a:rPr lang="de-DE" dirty="0" err="1">
                   <a:solidFill>
                     <a:schemeClr val="tx1"/>
                   </a:solidFill>
@@ -6496,7 +6496,7 @@
                     <a:schemeClr val="tx1"/>
                   </a:solidFill>
                 </a:rPr>
-                <a:t>Schreddi</a:t>
+                <a:t>Schredi</a:t>
               </a:r>
               <a:r>
                 <a:rPr lang="de-DE" dirty="0">
@@ -6764,7 +6764,7 @@
                     <a:schemeClr val="tx1"/>
                   </a:solidFill>
                 </a:rPr>
-                <a:t>Name	Datum	Teilen von</a:t>
+                <a:t>Name	Datum	Geteilt von</a:t>
               </a:r>
             </a:p>
           </p:txBody>
@@ -6943,7 +6943,7 @@
                     <a:schemeClr val="tx1"/>
                   </a:solidFill>
                 </a:rPr>
-                <a:t>Schreddi</a:t>
+                <a:t>Schredi</a:t>
               </a:r>
               <a:endParaRPr lang="de-DE" dirty="0">
                 <a:solidFill>

</xml_diff>

<commit_message>
Updated presentation - added Toolkits
</commit_message>
<xml_diff>
--- a/Filehost/Mockup.pptx
+++ b/Filehost/Mockup.pptx
@@ -13,6 +13,8 @@
     <p:sldId id="263" r:id="rId7"/>
     <p:sldId id="261" r:id="rId8"/>
     <p:sldId id="264" r:id="rId9"/>
+    <p:sldId id="265" r:id="rId10"/>
+    <p:sldId id="266" r:id="rId11"/>
   </p:sldIdLst>
   <p:sldSz cx="12192000" cy="6858000"/>
   <p:notesSz cx="6858000" cy="9144000"/>
@@ -3551,6 +3553,833 @@
     </mc:Choice>
     <mc:Fallback xmlns="">
       <p:transition spd="slow" advClick="0"/>
+    </mc:Fallback>
+  </mc:AlternateContent>
+</p:sld>
+</file>
+
+<file path=ppt/slides/slide10.xml><?xml version="1.0" encoding="utf-8"?>
+<p:sld xmlns:a="http://schemas.openxmlformats.org/drawingml/2006/main" xmlns:r="http://schemas.openxmlformats.org/officeDocument/2006/relationships" xmlns:p="http://schemas.openxmlformats.org/presentationml/2006/main">
+  <p:cSld>
+    <p:bg>
+      <p:bgPr>
+        <a:blipFill dpi="0" rotWithShape="1">
+          <a:blip r:embed="rId2">
+            <a:lum/>
+          </a:blip>
+          <a:srcRect/>
+          <a:stretch>
+            <a:fillRect t="-9000" b="-9000"/>
+          </a:stretch>
+        </a:blipFill>
+        <a:effectLst/>
+      </p:bgPr>
+    </p:bg>
+    <p:spTree>
+      <p:nvGrpSpPr>
+        <p:cNvPr id="1" name=""/>
+        <p:cNvGrpSpPr/>
+        <p:nvPr/>
+      </p:nvGrpSpPr>
+      <p:grpSpPr>
+        <a:xfrm>
+          <a:off x="0" y="0"/>
+          <a:ext cx="0" cy="0"/>
+          <a:chOff x="0" y="0"/>
+          <a:chExt cx="0" cy="0"/>
+        </a:xfrm>
+      </p:grpSpPr>
+      <p:sp>
+        <p:nvSpPr>
+          <p:cNvPr id="4" name="Rechteck 3">
+            <a:hlinkClick r:id="rId3" action="ppaction://hlinksldjump"/>
+            <a:extLst>
+              <a:ext uri="{FF2B5EF4-FFF2-40B4-BE49-F238E27FC236}">
+                <a16:creationId xmlns:a16="http://schemas.microsoft.com/office/drawing/2014/main" id="{4467B490-9AC4-4117-9CD1-691A07BD65E3}"/>
+              </a:ext>
+            </a:extLst>
+          </p:cNvPr>
+          <p:cNvSpPr/>
+          <p:nvPr/>
+        </p:nvSpPr>
+        <p:spPr>
+          <a:xfrm>
+            <a:off x="0" y="-571"/>
+            <a:ext cx="12192000" cy="576072"/>
+          </a:xfrm>
+          <a:prstGeom prst="rect">
+            <a:avLst/>
+          </a:prstGeom>
+          <a:solidFill>
+            <a:schemeClr val="bg1"/>
+          </a:solidFill>
+          <a:ln>
+            <a:noFill/>
+          </a:ln>
+        </p:spPr>
+        <p:style>
+          <a:lnRef idx="2">
+            <a:schemeClr val="accent1">
+              <a:shade val="50000"/>
+            </a:schemeClr>
+          </a:lnRef>
+          <a:fillRef idx="1">
+            <a:schemeClr val="accent1"/>
+          </a:fillRef>
+          <a:effectRef idx="0">
+            <a:schemeClr val="accent1"/>
+          </a:effectRef>
+          <a:fontRef idx="minor">
+            <a:schemeClr val="lt1"/>
+          </a:fontRef>
+        </p:style>
+        <p:txBody>
+          <a:bodyPr rtlCol="0" anchor="ctr"/>
+          <a:lstStyle/>
+          <a:p>
+            <a:pPr>
+              <a:tabLst>
+                <a:tab pos="92075" algn="l"/>
+              </a:tabLst>
+            </a:pPr>
+            <a:r>
+              <a:rPr lang="de-DE" dirty="0">
+                <a:solidFill>
+                  <a:schemeClr val="tx1"/>
+                </a:solidFill>
+              </a:rPr>
+              <a:t>	WTF – Web Technologies Filesharing</a:t>
+            </a:r>
+          </a:p>
+        </p:txBody>
+      </p:sp>
+      <p:sp>
+        <p:nvSpPr>
+          <p:cNvPr id="7" name="Ellipse 6">
+            <a:hlinkClick r:id="" action="ppaction://hlinkshowjump?jump=previousslide"/>
+            <a:extLst>
+              <a:ext uri="{FF2B5EF4-FFF2-40B4-BE49-F238E27FC236}">
+                <a16:creationId xmlns:a16="http://schemas.microsoft.com/office/drawing/2014/main" id="{C81C766A-F196-4521-97A8-94D75CC385AA}"/>
+              </a:ext>
+            </a:extLst>
+          </p:cNvPr>
+          <p:cNvSpPr/>
+          <p:nvPr/>
+        </p:nvSpPr>
+        <p:spPr>
+          <a:xfrm>
+            <a:off x="11625268" y="62866"/>
+            <a:ext cx="449199" cy="449199"/>
+          </a:xfrm>
+          <a:prstGeom prst="ellipse">
+            <a:avLst/>
+          </a:prstGeom>
+          <a:ln>
+            <a:noFill/>
+          </a:ln>
+        </p:spPr>
+        <p:style>
+          <a:lnRef idx="2">
+            <a:schemeClr val="accent1">
+              <a:shade val="50000"/>
+            </a:schemeClr>
+          </a:lnRef>
+          <a:fillRef idx="1">
+            <a:schemeClr val="accent1"/>
+          </a:fillRef>
+          <a:effectRef idx="0">
+            <a:schemeClr val="accent1"/>
+          </a:effectRef>
+          <a:fontRef idx="minor">
+            <a:schemeClr val="lt1"/>
+          </a:fontRef>
+        </p:style>
+        <p:txBody>
+          <a:bodyPr rtlCol="0" anchor="ctr"/>
+          <a:lstStyle/>
+          <a:p>
+            <a:pPr algn="ctr"/>
+            <a:r>
+              <a:rPr lang="de-DE" sz="2000" dirty="0"/>
+              <a:t>W</a:t>
+            </a:r>
+          </a:p>
+        </p:txBody>
+      </p:sp>
+      <p:pic>
+        <p:nvPicPr>
+          <p:cNvPr id="9" name="Grafik 8" descr="Glocke">
+            <a:extLst>
+              <a:ext uri="{FF2B5EF4-FFF2-40B4-BE49-F238E27FC236}">
+                <a16:creationId xmlns:a16="http://schemas.microsoft.com/office/drawing/2014/main" id="{50F0B152-6144-4626-AE63-8964DD3BE1A6}"/>
+              </a:ext>
+            </a:extLst>
+          </p:cNvPr>
+          <p:cNvPicPr>
+            <a:picLocks noChangeAspect="1"/>
+          </p:cNvPicPr>
+          <p:nvPr/>
+        </p:nvPicPr>
+        <p:blipFill>
+          <a:blip r:embed="rId4">
+            <a:extLst>
+              <a:ext uri="{28A0092B-C50C-407E-A947-70E740481C1C}">
+                <a14:useLocalDpi xmlns:a14="http://schemas.microsoft.com/office/drawing/2010/main" val="0"/>
+              </a:ext>
+              <a:ext uri="{96DAC541-7B7A-43D3-8B79-37D633B846F1}">
+                <asvg:svgBlip xmlns:asvg="http://schemas.microsoft.com/office/drawing/2016/SVG/main" r:embed="rId5"/>
+              </a:ext>
+            </a:extLst>
+          </a:blip>
+          <a:stretch>
+            <a:fillRect/>
+          </a:stretch>
+        </p:blipFill>
+        <p:spPr>
+          <a:xfrm>
+            <a:off x="11058536" y="62866"/>
+            <a:ext cx="449199" cy="449199"/>
+          </a:xfrm>
+          <a:prstGeom prst="rect">
+            <a:avLst/>
+          </a:prstGeom>
+        </p:spPr>
+      </p:pic>
+      <p:sp>
+        <p:nvSpPr>
+          <p:cNvPr id="10" name="Rechteck 9">
+            <a:extLst>
+              <a:ext uri="{FF2B5EF4-FFF2-40B4-BE49-F238E27FC236}">
+                <a16:creationId xmlns:a16="http://schemas.microsoft.com/office/drawing/2014/main" id="{0EEF7B46-82B1-48D2-9D33-5F9916521E90}"/>
+              </a:ext>
+            </a:extLst>
+          </p:cNvPr>
+          <p:cNvSpPr/>
+          <p:nvPr/>
+        </p:nvSpPr>
+        <p:spPr>
+          <a:xfrm>
+            <a:off x="167898" y="734309"/>
+            <a:ext cx="11906569" cy="576072"/>
+          </a:xfrm>
+          <a:prstGeom prst="rect">
+            <a:avLst/>
+          </a:prstGeom>
+          <a:solidFill>
+            <a:schemeClr val="bg1"/>
+          </a:solidFill>
+          <a:ln>
+            <a:noFill/>
+          </a:ln>
+        </p:spPr>
+        <p:style>
+          <a:lnRef idx="2">
+            <a:schemeClr val="accent1">
+              <a:shade val="50000"/>
+            </a:schemeClr>
+          </a:lnRef>
+          <a:fillRef idx="1">
+            <a:schemeClr val="accent1"/>
+          </a:fillRef>
+          <a:effectRef idx="0">
+            <a:schemeClr val="accent1"/>
+          </a:effectRef>
+          <a:fontRef idx="minor">
+            <a:schemeClr val="lt1"/>
+          </a:fontRef>
+        </p:style>
+        <p:txBody>
+          <a:bodyPr rtlCol="0" anchor="ctr"/>
+          <a:lstStyle/>
+          <a:p>
+            <a:r>
+              <a:rPr lang="de-DE" sz="2800" dirty="0">
+                <a:solidFill>
+                  <a:schemeClr val="tx1"/>
+                </a:solidFill>
+              </a:rPr>
+              <a:t>Toolkits</a:t>
+            </a:r>
+          </a:p>
+        </p:txBody>
+      </p:sp>
+      <p:sp>
+        <p:nvSpPr>
+          <p:cNvPr id="20" name="Rechteck 19">
+            <a:extLst>
+              <a:ext uri="{FF2B5EF4-FFF2-40B4-BE49-F238E27FC236}">
+                <a16:creationId xmlns:a16="http://schemas.microsoft.com/office/drawing/2014/main" id="{EC644AE3-78D8-4994-8DDD-74EC2779CEDE}"/>
+              </a:ext>
+            </a:extLst>
+          </p:cNvPr>
+          <p:cNvSpPr/>
+          <p:nvPr/>
+        </p:nvSpPr>
+        <p:spPr>
+          <a:xfrm>
+            <a:off x="167898" y="1310380"/>
+            <a:ext cx="11906569" cy="5383931"/>
+          </a:xfrm>
+          <a:prstGeom prst="rect">
+            <a:avLst/>
+          </a:prstGeom>
+          <a:solidFill>
+            <a:schemeClr val="bg1"/>
+          </a:solidFill>
+          <a:ln>
+            <a:noFill/>
+          </a:ln>
+        </p:spPr>
+        <p:style>
+          <a:lnRef idx="2">
+            <a:schemeClr val="accent1">
+              <a:shade val="50000"/>
+            </a:schemeClr>
+          </a:lnRef>
+          <a:fillRef idx="1">
+            <a:schemeClr val="accent1"/>
+          </a:fillRef>
+          <a:effectRef idx="0">
+            <a:schemeClr val="accent1"/>
+          </a:effectRef>
+          <a:fontRef idx="minor">
+            <a:schemeClr val="lt1"/>
+          </a:fontRef>
+        </p:style>
+        <p:txBody>
+          <a:bodyPr numCol="1" rtlCol="0" anchor="ctr"/>
+          <a:lstStyle/>
+          <a:p>
+            <a:endParaRPr lang="de-DE" dirty="0">
+              <a:solidFill>
+                <a:schemeClr val="tx1"/>
+              </a:solidFill>
+            </a:endParaRPr>
+          </a:p>
+        </p:txBody>
+      </p:sp>
+      <p:cxnSp>
+        <p:nvCxnSpPr>
+          <p:cNvPr id="25" name="Gerader Verbinder 24">
+            <a:extLst>
+              <a:ext uri="{FF2B5EF4-FFF2-40B4-BE49-F238E27FC236}">
+                <a16:creationId xmlns:a16="http://schemas.microsoft.com/office/drawing/2014/main" id="{2745E54D-A3BE-4F3D-827F-FAB536FE7F7C}"/>
+              </a:ext>
+            </a:extLst>
+          </p:cNvPr>
+          <p:cNvCxnSpPr>
+            <a:cxnSpLocks/>
+          </p:cNvCxnSpPr>
+          <p:nvPr/>
+        </p:nvCxnSpPr>
+        <p:spPr>
+          <a:xfrm>
+            <a:off x="167898" y="1354984"/>
+            <a:ext cx="11906569" cy="0"/>
+          </a:xfrm>
+          <a:prstGeom prst="line">
+            <a:avLst/>
+          </a:prstGeom>
+          <a:ln>
+            <a:solidFill>
+              <a:schemeClr val="tx1"/>
+            </a:solidFill>
+          </a:ln>
+        </p:spPr>
+        <p:style>
+          <a:lnRef idx="1">
+            <a:schemeClr val="accent1"/>
+          </a:lnRef>
+          <a:fillRef idx="0">
+            <a:schemeClr val="accent1"/>
+          </a:fillRef>
+          <a:effectRef idx="0">
+            <a:schemeClr val="accent1"/>
+          </a:effectRef>
+          <a:fontRef idx="minor">
+            <a:schemeClr val="tx1"/>
+          </a:fontRef>
+        </p:style>
+      </p:cxnSp>
+      <p:grpSp>
+        <p:nvGrpSpPr>
+          <p:cNvPr id="44" name="Gruppieren 43">
+            <a:extLst>
+              <a:ext uri="{FF2B5EF4-FFF2-40B4-BE49-F238E27FC236}">
+                <a16:creationId xmlns:a16="http://schemas.microsoft.com/office/drawing/2014/main" id="{8F0CED83-CA40-4808-8928-E3429D5E766B}"/>
+              </a:ext>
+            </a:extLst>
+          </p:cNvPr>
+          <p:cNvGrpSpPr/>
+          <p:nvPr/>
+        </p:nvGrpSpPr>
+        <p:grpSpPr>
+          <a:xfrm>
+            <a:off x="3451361" y="1536707"/>
+            <a:ext cx="5289278" cy="1864858"/>
+            <a:chOff x="3451361" y="1536707"/>
+            <a:chExt cx="5289278" cy="1864858"/>
+          </a:xfrm>
+        </p:grpSpPr>
+        <p:grpSp>
+          <p:nvGrpSpPr>
+            <p:cNvPr id="26" name="Gruppieren 25">
+              <a:extLst>
+                <a:ext uri="{FF2B5EF4-FFF2-40B4-BE49-F238E27FC236}">
+                  <a16:creationId xmlns:a16="http://schemas.microsoft.com/office/drawing/2014/main" id="{CB928448-8CE3-4D00-83E3-4A47ECEA28F7}"/>
+                </a:ext>
+              </a:extLst>
+            </p:cNvPr>
+            <p:cNvGrpSpPr/>
+            <p:nvPr/>
+          </p:nvGrpSpPr>
+          <p:grpSpPr>
+            <a:xfrm>
+              <a:off x="3451361" y="2070855"/>
+              <a:ext cx="5289278" cy="1330710"/>
+              <a:chOff x="5019561" y="1907016"/>
+              <a:chExt cx="5289278" cy="1330710"/>
+            </a:xfrm>
+          </p:grpSpPr>
+          <p:pic>
+            <p:nvPicPr>
+              <p:cNvPr id="6" name="Grafik 5">
+                <a:extLst>
+                  <a:ext uri="{FF2B5EF4-FFF2-40B4-BE49-F238E27FC236}">
+                    <a16:creationId xmlns:a16="http://schemas.microsoft.com/office/drawing/2014/main" id="{AA41E61D-06BE-43C5-8D97-D1EC32093046}"/>
+                  </a:ext>
+                </a:extLst>
+              </p:cNvPr>
+              <p:cNvPicPr>
+                <a:picLocks noChangeAspect="1"/>
+              </p:cNvPicPr>
+              <p:nvPr/>
+            </p:nvPicPr>
+            <p:blipFill>
+              <a:blip r:embed="rId6">
+                <a:extLst>
+                  <a:ext uri="{28A0092B-C50C-407E-A947-70E740481C1C}">
+                    <a14:useLocalDpi xmlns:a14="http://schemas.microsoft.com/office/drawing/2010/main" val="0"/>
+                  </a:ext>
+                </a:extLst>
+              </a:blip>
+              <a:stretch>
+                <a:fillRect/>
+              </a:stretch>
+            </p:blipFill>
+            <p:spPr>
+              <a:xfrm>
+                <a:off x="5019561" y="1907016"/>
+                <a:ext cx="1330710" cy="1330710"/>
+              </a:xfrm>
+              <a:prstGeom prst="rect">
+                <a:avLst/>
+              </a:prstGeom>
+            </p:spPr>
+          </p:pic>
+          <p:sp>
+            <p:nvSpPr>
+              <p:cNvPr id="41" name="Rechteck: abgerundete Ecken 40">
+                <a:extLst>
+                  <a:ext uri="{FF2B5EF4-FFF2-40B4-BE49-F238E27FC236}">
+                    <a16:creationId xmlns:a16="http://schemas.microsoft.com/office/drawing/2014/main" id="{F5B2BDC0-50E3-43FC-85B3-E889BACBB5DE}"/>
+                  </a:ext>
+                </a:extLst>
+              </p:cNvPr>
+              <p:cNvSpPr/>
+              <p:nvPr/>
+            </p:nvSpPr>
+            <p:spPr>
+              <a:xfrm>
+                <a:off x="6832824" y="2232713"/>
+                <a:ext cx="3476015" cy="679316"/>
+              </a:xfrm>
+              <a:prstGeom prst="roundRect">
+                <a:avLst/>
+              </a:prstGeom>
+              <a:blipFill dpi="0" rotWithShape="1">
+                <a:blip r:embed="rId7"/>
+                <a:srcRect/>
+                <a:stretch>
+                  <a:fillRect/>
+                </a:stretch>
+              </a:blipFill>
+              <a:ln>
+                <a:noFill/>
+              </a:ln>
+            </p:spPr>
+            <p:style>
+              <a:lnRef idx="2">
+                <a:schemeClr val="accent1">
+                  <a:shade val="50000"/>
+                </a:schemeClr>
+              </a:lnRef>
+              <a:fillRef idx="1">
+                <a:schemeClr val="accent1"/>
+              </a:fillRef>
+              <a:effectRef idx="0">
+                <a:schemeClr val="accent1"/>
+              </a:effectRef>
+              <a:fontRef idx="minor">
+                <a:schemeClr val="lt1"/>
+              </a:fontRef>
+            </p:style>
+            <p:txBody>
+              <a:bodyPr rtlCol="0" anchor="ctr"/>
+              <a:lstStyle/>
+              <a:p>
+                <a:pPr algn="ctr"/>
+                <a:endParaRPr lang="de-DE" sz="2800" dirty="0"/>
+              </a:p>
+            </p:txBody>
+          </p:sp>
+        </p:grpSp>
+        <p:sp>
+          <p:nvSpPr>
+            <p:cNvPr id="22" name="Textfeld 21">
+              <a:extLst>
+                <a:ext uri="{FF2B5EF4-FFF2-40B4-BE49-F238E27FC236}">
+                  <a16:creationId xmlns:a16="http://schemas.microsoft.com/office/drawing/2014/main" id="{C20C9AEC-75DB-4D62-B641-361706987740}"/>
+                </a:ext>
+              </a:extLst>
+            </p:cNvPr>
+            <p:cNvSpPr txBox="1"/>
+            <p:nvPr/>
+          </p:nvSpPr>
+          <p:spPr>
+            <a:xfrm>
+              <a:off x="4730045" y="1536707"/>
+              <a:ext cx="2731911" cy="523220"/>
+            </a:xfrm>
+            <a:prstGeom prst="rect">
+              <a:avLst/>
+            </a:prstGeom>
+            <a:noFill/>
+          </p:spPr>
+          <p:txBody>
+            <a:bodyPr wrap="square" rtlCol="0">
+              <a:spAutoFit/>
+            </a:bodyPr>
+            <a:lstStyle/>
+            <a:p>
+              <a:pPr algn="ctr"/>
+              <a:r>
+                <a:rPr lang="de-DE" sz="2800" dirty="0"/>
+                <a:t>Frontend</a:t>
+              </a:r>
+            </a:p>
+          </p:txBody>
+        </p:sp>
+      </p:grpSp>
+      <p:grpSp>
+        <p:nvGrpSpPr>
+          <p:cNvPr id="46" name="Gruppieren 45">
+            <a:extLst>
+              <a:ext uri="{FF2B5EF4-FFF2-40B4-BE49-F238E27FC236}">
+                <a16:creationId xmlns:a16="http://schemas.microsoft.com/office/drawing/2014/main" id="{927F849B-61F2-4C2A-8161-5A6FE220AF88}"/>
+              </a:ext>
+            </a:extLst>
+          </p:cNvPr>
+          <p:cNvGrpSpPr/>
+          <p:nvPr/>
+        </p:nvGrpSpPr>
+        <p:grpSpPr>
+          <a:xfrm>
+            <a:off x="1185491" y="4069315"/>
+            <a:ext cx="9821018" cy="2009297"/>
+            <a:chOff x="1185491" y="4069315"/>
+            <a:chExt cx="9821018" cy="2009297"/>
+          </a:xfrm>
+        </p:grpSpPr>
+        <p:grpSp>
+          <p:nvGrpSpPr>
+            <p:cNvPr id="45" name="Gruppieren 44">
+              <a:extLst>
+                <a:ext uri="{FF2B5EF4-FFF2-40B4-BE49-F238E27FC236}">
+                  <a16:creationId xmlns:a16="http://schemas.microsoft.com/office/drawing/2014/main" id="{EC64FD27-ACE0-4D81-A8B5-849B273377C3}"/>
+                </a:ext>
+              </a:extLst>
+            </p:cNvPr>
+            <p:cNvGrpSpPr/>
+            <p:nvPr/>
+          </p:nvGrpSpPr>
+          <p:grpSpPr>
+            <a:xfrm>
+              <a:off x="1185491" y="4592535"/>
+              <a:ext cx="9821018" cy="1486077"/>
+              <a:chOff x="941225" y="4592535"/>
+              <a:chExt cx="9821018" cy="1486077"/>
+            </a:xfrm>
+          </p:grpSpPr>
+          <p:pic>
+            <p:nvPicPr>
+              <p:cNvPr id="13" name="Grafik 12">
+                <a:extLst>
+                  <a:ext uri="{FF2B5EF4-FFF2-40B4-BE49-F238E27FC236}">
+                    <a16:creationId xmlns:a16="http://schemas.microsoft.com/office/drawing/2014/main" id="{A7787D28-488B-4FD4-AC14-3E2115B7D4F4}"/>
+                  </a:ext>
+                </a:extLst>
+              </p:cNvPr>
+              <p:cNvPicPr>
+                <a:picLocks noChangeAspect="1"/>
+              </p:cNvPicPr>
+              <p:nvPr/>
+            </p:nvPicPr>
+            <p:blipFill>
+              <a:blip r:embed="rId8">
+                <a:extLst>
+                  <a:ext uri="{28A0092B-C50C-407E-A947-70E740481C1C}">
+                    <a14:useLocalDpi xmlns:a14="http://schemas.microsoft.com/office/drawing/2010/main" val="0"/>
+                  </a:ext>
+                </a:extLst>
+              </a:blip>
+              <a:stretch>
+                <a:fillRect/>
+              </a:stretch>
+            </p:blipFill>
+            <p:spPr>
+              <a:xfrm>
+                <a:off x="941225" y="4739903"/>
+                <a:ext cx="2188625" cy="1338709"/>
+              </a:xfrm>
+              <a:prstGeom prst="rect">
+                <a:avLst/>
+              </a:prstGeom>
+            </p:spPr>
+          </p:pic>
+          <p:pic>
+            <p:nvPicPr>
+              <p:cNvPr id="15" name="Grafik 14">
+                <a:extLst>
+                  <a:ext uri="{FF2B5EF4-FFF2-40B4-BE49-F238E27FC236}">
+                    <a16:creationId xmlns:a16="http://schemas.microsoft.com/office/drawing/2014/main" id="{07353223-BA0A-445F-90AA-5545DFDB05BB}"/>
+                  </a:ext>
+                </a:extLst>
+              </p:cNvPr>
+              <p:cNvPicPr>
+                <a:picLocks noChangeAspect="1"/>
+              </p:cNvPicPr>
+              <p:nvPr/>
+            </p:nvPicPr>
+            <p:blipFill>
+              <a:blip r:embed="rId9">
+                <a:extLst>
+                  <a:ext uri="{28A0092B-C50C-407E-A947-70E740481C1C}">
+                    <a14:useLocalDpi xmlns:a14="http://schemas.microsoft.com/office/drawing/2010/main" val="0"/>
+                  </a:ext>
+                </a:extLst>
+              </a:blip>
+              <a:stretch>
+                <a:fillRect/>
+              </a:stretch>
+            </p:blipFill>
+            <p:spPr>
+              <a:xfrm>
+                <a:off x="8190823" y="4592535"/>
+                <a:ext cx="2571420" cy="1330710"/>
+              </a:xfrm>
+              <a:prstGeom prst="rect">
+                <a:avLst/>
+              </a:prstGeom>
+            </p:spPr>
+          </p:pic>
+          <p:pic>
+            <p:nvPicPr>
+              <p:cNvPr id="21" name="Grafik 20">
+                <a:extLst>
+                  <a:ext uri="{FF2B5EF4-FFF2-40B4-BE49-F238E27FC236}">
+                    <a16:creationId xmlns:a16="http://schemas.microsoft.com/office/drawing/2014/main" id="{035548D0-FF84-4D4E-BF2B-51CD62792A3F}"/>
+                  </a:ext>
+                </a:extLst>
+              </p:cNvPr>
+              <p:cNvPicPr>
+                <a:picLocks noChangeAspect="1"/>
+              </p:cNvPicPr>
+              <p:nvPr/>
+            </p:nvPicPr>
+            <p:blipFill>
+              <a:blip r:embed="rId10"/>
+              <a:stretch>
+                <a:fillRect/>
+              </a:stretch>
+            </p:blipFill>
+            <p:spPr>
+              <a:xfrm>
+                <a:off x="3451361" y="4738975"/>
+                <a:ext cx="4417951" cy="1339637"/>
+              </a:xfrm>
+              <a:prstGeom prst="rect">
+                <a:avLst/>
+              </a:prstGeom>
+            </p:spPr>
+          </p:pic>
+        </p:grpSp>
+        <p:sp>
+          <p:nvSpPr>
+            <p:cNvPr id="43" name="Textfeld 42">
+              <a:extLst>
+                <a:ext uri="{FF2B5EF4-FFF2-40B4-BE49-F238E27FC236}">
+                  <a16:creationId xmlns:a16="http://schemas.microsoft.com/office/drawing/2014/main" id="{DEE59AD9-3A6A-4D06-8966-DC214C97DC01}"/>
+                </a:ext>
+              </a:extLst>
+            </p:cNvPr>
+            <p:cNvSpPr txBox="1"/>
+            <p:nvPr/>
+          </p:nvSpPr>
+          <p:spPr>
+            <a:xfrm>
+              <a:off x="4730045" y="4069315"/>
+              <a:ext cx="2731911" cy="523220"/>
+            </a:xfrm>
+            <a:prstGeom prst="rect">
+              <a:avLst/>
+            </a:prstGeom>
+            <a:noFill/>
+          </p:spPr>
+          <p:txBody>
+            <a:bodyPr wrap="square" rtlCol="0">
+              <a:spAutoFit/>
+            </a:bodyPr>
+            <a:lstStyle/>
+            <a:p>
+              <a:pPr algn="ctr"/>
+              <a:r>
+                <a:rPr lang="de-DE" sz="2800" dirty="0"/>
+                <a:t>Backend</a:t>
+              </a:r>
+            </a:p>
+          </p:txBody>
+        </p:sp>
+      </p:grpSp>
+      <p:sp>
+        <p:nvSpPr>
+          <p:cNvPr id="19" name="Sprechblase: rechteckig 18">
+            <a:hlinkClick r:id="rId11" action="ppaction://hlinksldjump"/>
+            <a:extLst>
+              <a:ext uri="{FF2B5EF4-FFF2-40B4-BE49-F238E27FC236}">
+                <a16:creationId xmlns:a16="http://schemas.microsoft.com/office/drawing/2014/main" id="{7D397CDA-4976-485B-8313-FDE12A216E7E}"/>
+              </a:ext>
+            </a:extLst>
+          </p:cNvPr>
+          <p:cNvSpPr/>
+          <p:nvPr/>
+        </p:nvSpPr>
+        <p:spPr>
+          <a:xfrm>
+            <a:off x="11087876" y="584932"/>
+            <a:ext cx="1070875" cy="425416"/>
+          </a:xfrm>
+          <a:prstGeom prst="wedgeRectCallout">
+            <a:avLst>
+              <a:gd name="adj1" fmla="val 21176"/>
+              <a:gd name="adj2" fmla="val -66236"/>
+            </a:avLst>
+          </a:prstGeom>
+          <a:solidFill>
+            <a:schemeClr val="accent1"/>
+          </a:solidFill>
+          <a:ln>
+            <a:noFill/>
+          </a:ln>
+        </p:spPr>
+        <p:style>
+          <a:lnRef idx="2">
+            <a:schemeClr val="accent1">
+              <a:shade val="50000"/>
+            </a:schemeClr>
+          </a:lnRef>
+          <a:fillRef idx="1">
+            <a:schemeClr val="accent1"/>
+          </a:fillRef>
+          <a:effectRef idx="0">
+            <a:schemeClr val="accent1"/>
+          </a:effectRef>
+          <a:fontRef idx="minor">
+            <a:schemeClr val="lt1"/>
+          </a:fontRef>
+        </p:style>
+        <p:txBody>
+          <a:bodyPr rtlCol="0" anchor="ctr"/>
+          <a:lstStyle/>
+          <a:p>
+            <a:pPr algn="ctr"/>
+            <a:r>
+              <a:rPr lang="de-DE" sz="1600" dirty="0"/>
+              <a:t>Logout</a:t>
+            </a:r>
+          </a:p>
+        </p:txBody>
+      </p:sp>
+      <p:sp>
+        <p:nvSpPr>
+          <p:cNvPr id="23" name="Rechteck 22">
+            <a:hlinkClick r:id="" action="ppaction://hlinkshowjump?jump=previousslide"/>
+            <a:extLst>
+              <a:ext uri="{FF2B5EF4-FFF2-40B4-BE49-F238E27FC236}">
+                <a16:creationId xmlns:a16="http://schemas.microsoft.com/office/drawing/2014/main" id="{8B7F5E58-2415-4A42-AAB2-203570D859AB}"/>
+              </a:ext>
+            </a:extLst>
+          </p:cNvPr>
+          <p:cNvSpPr/>
+          <p:nvPr/>
+        </p:nvSpPr>
+        <p:spPr>
+          <a:xfrm>
+            <a:off x="11087875" y="1004476"/>
+            <a:ext cx="1070875" cy="425416"/>
+          </a:xfrm>
+          <a:prstGeom prst="rect">
+            <a:avLst/>
+          </a:prstGeom>
+          <a:ln>
+            <a:noFill/>
+          </a:ln>
+        </p:spPr>
+        <p:style>
+          <a:lnRef idx="2">
+            <a:schemeClr val="accent1">
+              <a:shade val="50000"/>
+            </a:schemeClr>
+          </a:lnRef>
+          <a:fillRef idx="1">
+            <a:schemeClr val="accent1"/>
+          </a:fillRef>
+          <a:effectRef idx="0">
+            <a:schemeClr val="accent1"/>
+          </a:effectRef>
+          <a:fontRef idx="minor">
+            <a:schemeClr val="lt1"/>
+          </a:fontRef>
+        </p:style>
+        <p:txBody>
+          <a:bodyPr rtlCol="0" anchor="ctr"/>
+          <a:lstStyle/>
+          <a:p>
+            <a:pPr algn="ctr"/>
+            <a:r>
+              <a:rPr lang="de-DE" sz="1600" dirty="0"/>
+              <a:t>About</a:t>
+            </a:r>
+            <a:endParaRPr lang="de-DE" dirty="0"/>
+          </a:p>
+        </p:txBody>
+      </p:sp>
+    </p:spTree>
+    <p:extLst>
+      <p:ext uri="{BB962C8B-B14F-4D97-AF65-F5344CB8AC3E}">
+        <p14:creationId xmlns:p14="http://schemas.microsoft.com/office/powerpoint/2010/main" val="3575654412"/>
+      </p:ext>
+    </p:extLst>
+  </p:cSld>
+  <p:clrMapOvr>
+    <a:masterClrMapping/>
+  </p:clrMapOvr>
+  <mc:AlternateContent xmlns:mc="http://schemas.openxmlformats.org/markup-compatibility/2006">
+    <mc:Choice xmlns:p14="http://schemas.microsoft.com/office/powerpoint/2010/main" Requires="p14">
+      <p:transition p14:dur="10" advClick="0"/>
+    </mc:Choice>
+    <mc:Fallback>
+      <p:transition advClick="0"/>
     </mc:Fallback>
   </mc:AlternateContent>
 </p:sld>
@@ -5719,7 +6548,7 @@
                     <a:schemeClr val="tx1"/>
                   </a:solidFill>
                 </a:rPr>
-                <a:t>Name	Datum	Teilen von</a:t>
+                <a:t>Name	Datum	Geteilt von</a:t>
               </a:r>
             </a:p>
           </p:txBody>
@@ -6496,7 +7325,7 @@
                     <a:schemeClr val="tx1"/>
                   </a:solidFill>
                 </a:rPr>
-                <a:t>Schreddi</a:t>
+                <a:t>Schredi</a:t>
               </a:r>
               <a:r>
                 <a:rPr lang="de-DE" dirty="0">
@@ -6764,7 +7593,7 @@
                     <a:schemeClr val="tx1"/>
                   </a:solidFill>
                 </a:rPr>
-                <a:t>Name	Datum	Teilen von</a:t>
+                <a:t>Name	Datum	Geteilt von</a:t>
               </a:r>
             </a:p>
           </p:txBody>
@@ -6943,7 +7772,7 @@
                     <a:schemeClr val="tx1"/>
                   </a:solidFill>
                 </a:rPr>
-                <a:t>Schreddi</a:t>
+                <a:t>Schredi</a:t>
               </a:r>
               <a:endParaRPr lang="de-DE" dirty="0">
                 <a:solidFill>
@@ -7077,6 +7906,60 @@
           </a:p>
         </p:txBody>
       </p:sp>
+      <p:sp>
+        <p:nvSpPr>
+          <p:cNvPr id="3" name="Rechteck 2">
+            <a:hlinkClick r:id="rId7" action="ppaction://hlinksldjump"/>
+            <a:extLst>
+              <a:ext uri="{FF2B5EF4-FFF2-40B4-BE49-F238E27FC236}">
+                <a16:creationId xmlns:a16="http://schemas.microsoft.com/office/drawing/2014/main" id="{CF22889A-B3B3-4419-89B1-BB2C01E08B50}"/>
+              </a:ext>
+            </a:extLst>
+          </p:cNvPr>
+          <p:cNvSpPr/>
+          <p:nvPr/>
+        </p:nvSpPr>
+        <p:spPr>
+          <a:xfrm>
+            <a:off x="11087875" y="1004476"/>
+            <a:ext cx="1070875" cy="425416"/>
+          </a:xfrm>
+          <a:prstGeom prst="rect">
+            <a:avLst/>
+          </a:prstGeom>
+          <a:ln>
+            <a:noFill/>
+          </a:ln>
+        </p:spPr>
+        <p:style>
+          <a:lnRef idx="2">
+            <a:schemeClr val="accent1">
+              <a:shade val="50000"/>
+            </a:schemeClr>
+          </a:lnRef>
+          <a:fillRef idx="1">
+            <a:schemeClr val="accent1"/>
+          </a:fillRef>
+          <a:effectRef idx="0">
+            <a:schemeClr val="accent1"/>
+          </a:effectRef>
+          <a:fontRef idx="minor">
+            <a:schemeClr val="lt1"/>
+          </a:fontRef>
+        </p:style>
+        <p:txBody>
+          <a:bodyPr rtlCol="0" anchor="ctr"/>
+          <a:lstStyle/>
+          <a:p>
+            <a:pPr algn="ctr"/>
+            <a:r>
+              <a:rPr lang="de-DE" sz="1600" dirty="0"/>
+              <a:t>About</a:t>
+            </a:r>
+            <a:endParaRPr lang="de-DE" dirty="0"/>
+          </a:p>
+        </p:txBody>
+      </p:sp>
     </p:spTree>
     <p:extLst>
       <p:ext uri="{BB962C8B-B14F-4D97-AF65-F5344CB8AC3E}">
@@ -7092,6 +7975,720 @@
       <p:transition p14:dur="0" advClick="0"/>
     </mc:Choice>
     <mc:Fallback xmlns="">
+      <p:transition advClick="0"/>
+    </mc:Fallback>
+  </mc:AlternateContent>
+</p:sld>
+</file>
+
+<file path=ppt/slides/slide9.xml><?xml version="1.0" encoding="utf-8"?>
+<p:sld xmlns:a="http://schemas.openxmlformats.org/drawingml/2006/main" xmlns:r="http://schemas.openxmlformats.org/officeDocument/2006/relationships" xmlns:p="http://schemas.openxmlformats.org/presentationml/2006/main">
+  <p:cSld>
+    <p:bg>
+      <p:bgPr>
+        <a:blipFill dpi="0" rotWithShape="1">
+          <a:blip r:embed="rId2">
+            <a:lum/>
+          </a:blip>
+          <a:srcRect/>
+          <a:stretch>
+            <a:fillRect t="-9000" b="-9000"/>
+          </a:stretch>
+        </a:blipFill>
+        <a:effectLst/>
+      </p:bgPr>
+    </p:bg>
+    <p:spTree>
+      <p:nvGrpSpPr>
+        <p:cNvPr id="1" name=""/>
+        <p:cNvGrpSpPr/>
+        <p:nvPr/>
+      </p:nvGrpSpPr>
+      <p:grpSpPr>
+        <a:xfrm>
+          <a:off x="0" y="0"/>
+          <a:ext cx="0" cy="0"/>
+          <a:chOff x="0" y="0"/>
+          <a:chExt cx="0" cy="0"/>
+        </a:xfrm>
+      </p:grpSpPr>
+      <p:sp>
+        <p:nvSpPr>
+          <p:cNvPr id="4" name="Rechteck 3">
+            <a:hlinkClick r:id="rId3" action="ppaction://hlinksldjump"/>
+            <a:extLst>
+              <a:ext uri="{FF2B5EF4-FFF2-40B4-BE49-F238E27FC236}">
+                <a16:creationId xmlns:a16="http://schemas.microsoft.com/office/drawing/2014/main" id="{4467B490-9AC4-4117-9CD1-691A07BD65E3}"/>
+              </a:ext>
+            </a:extLst>
+          </p:cNvPr>
+          <p:cNvSpPr/>
+          <p:nvPr/>
+        </p:nvSpPr>
+        <p:spPr>
+          <a:xfrm>
+            <a:off x="0" y="-571"/>
+            <a:ext cx="12192000" cy="576072"/>
+          </a:xfrm>
+          <a:prstGeom prst="rect">
+            <a:avLst/>
+          </a:prstGeom>
+          <a:solidFill>
+            <a:schemeClr val="bg1"/>
+          </a:solidFill>
+          <a:ln>
+            <a:noFill/>
+          </a:ln>
+        </p:spPr>
+        <p:style>
+          <a:lnRef idx="2">
+            <a:schemeClr val="accent1">
+              <a:shade val="50000"/>
+            </a:schemeClr>
+          </a:lnRef>
+          <a:fillRef idx="1">
+            <a:schemeClr val="accent1"/>
+          </a:fillRef>
+          <a:effectRef idx="0">
+            <a:schemeClr val="accent1"/>
+          </a:effectRef>
+          <a:fontRef idx="minor">
+            <a:schemeClr val="lt1"/>
+          </a:fontRef>
+        </p:style>
+        <p:txBody>
+          <a:bodyPr rtlCol="0" anchor="ctr"/>
+          <a:lstStyle/>
+          <a:p>
+            <a:pPr>
+              <a:tabLst>
+                <a:tab pos="92075" algn="l"/>
+              </a:tabLst>
+            </a:pPr>
+            <a:r>
+              <a:rPr lang="de-DE" dirty="0">
+                <a:solidFill>
+                  <a:schemeClr val="tx1"/>
+                </a:solidFill>
+              </a:rPr>
+              <a:t>	WTF – Web Technologies Filesharing</a:t>
+            </a:r>
+          </a:p>
+        </p:txBody>
+      </p:sp>
+      <p:sp>
+        <p:nvSpPr>
+          <p:cNvPr id="7" name="Ellipse 6">
+            <a:hlinkClick r:id="rId4" action="ppaction://hlinksldjump"/>
+            <a:extLst>
+              <a:ext uri="{FF2B5EF4-FFF2-40B4-BE49-F238E27FC236}">
+                <a16:creationId xmlns:a16="http://schemas.microsoft.com/office/drawing/2014/main" id="{C81C766A-F196-4521-97A8-94D75CC385AA}"/>
+              </a:ext>
+            </a:extLst>
+          </p:cNvPr>
+          <p:cNvSpPr/>
+          <p:nvPr/>
+        </p:nvSpPr>
+        <p:spPr>
+          <a:xfrm>
+            <a:off x="11625268" y="62866"/>
+            <a:ext cx="449199" cy="449199"/>
+          </a:xfrm>
+          <a:prstGeom prst="ellipse">
+            <a:avLst/>
+          </a:prstGeom>
+          <a:ln>
+            <a:noFill/>
+          </a:ln>
+        </p:spPr>
+        <p:style>
+          <a:lnRef idx="2">
+            <a:schemeClr val="accent1">
+              <a:shade val="50000"/>
+            </a:schemeClr>
+          </a:lnRef>
+          <a:fillRef idx="1">
+            <a:schemeClr val="accent1"/>
+          </a:fillRef>
+          <a:effectRef idx="0">
+            <a:schemeClr val="accent1"/>
+          </a:effectRef>
+          <a:fontRef idx="minor">
+            <a:schemeClr val="lt1"/>
+          </a:fontRef>
+        </p:style>
+        <p:txBody>
+          <a:bodyPr rtlCol="0" anchor="ctr"/>
+          <a:lstStyle/>
+          <a:p>
+            <a:pPr algn="ctr"/>
+            <a:r>
+              <a:rPr lang="de-DE" sz="2000" dirty="0"/>
+              <a:t>W</a:t>
+            </a:r>
+          </a:p>
+        </p:txBody>
+      </p:sp>
+      <p:pic>
+        <p:nvPicPr>
+          <p:cNvPr id="9" name="Grafik 8" descr="Glocke">
+            <a:extLst>
+              <a:ext uri="{FF2B5EF4-FFF2-40B4-BE49-F238E27FC236}">
+                <a16:creationId xmlns:a16="http://schemas.microsoft.com/office/drawing/2014/main" id="{50F0B152-6144-4626-AE63-8964DD3BE1A6}"/>
+              </a:ext>
+            </a:extLst>
+          </p:cNvPr>
+          <p:cNvPicPr>
+            <a:picLocks noChangeAspect="1"/>
+          </p:cNvPicPr>
+          <p:nvPr/>
+        </p:nvPicPr>
+        <p:blipFill>
+          <a:blip r:embed="rId5">
+            <a:extLst>
+              <a:ext uri="{28A0092B-C50C-407E-A947-70E740481C1C}">
+                <a14:useLocalDpi xmlns:a14="http://schemas.microsoft.com/office/drawing/2010/main" val="0"/>
+              </a:ext>
+              <a:ext uri="{96DAC541-7B7A-43D3-8B79-37D633B846F1}">
+                <asvg:svgBlip xmlns:asvg="http://schemas.microsoft.com/office/drawing/2016/SVG/main" r:embed="rId6"/>
+              </a:ext>
+            </a:extLst>
+          </a:blip>
+          <a:stretch>
+            <a:fillRect/>
+          </a:stretch>
+        </p:blipFill>
+        <p:spPr>
+          <a:xfrm>
+            <a:off x="11058536" y="62866"/>
+            <a:ext cx="449199" cy="449199"/>
+          </a:xfrm>
+          <a:prstGeom prst="rect">
+            <a:avLst/>
+          </a:prstGeom>
+        </p:spPr>
+      </p:pic>
+      <p:sp>
+        <p:nvSpPr>
+          <p:cNvPr id="10" name="Rechteck 9">
+            <a:extLst>
+              <a:ext uri="{FF2B5EF4-FFF2-40B4-BE49-F238E27FC236}">
+                <a16:creationId xmlns:a16="http://schemas.microsoft.com/office/drawing/2014/main" id="{0EEF7B46-82B1-48D2-9D33-5F9916521E90}"/>
+              </a:ext>
+            </a:extLst>
+          </p:cNvPr>
+          <p:cNvSpPr/>
+          <p:nvPr/>
+        </p:nvSpPr>
+        <p:spPr>
+          <a:xfrm>
+            <a:off x="167898" y="734309"/>
+            <a:ext cx="11906569" cy="576072"/>
+          </a:xfrm>
+          <a:prstGeom prst="rect">
+            <a:avLst/>
+          </a:prstGeom>
+          <a:solidFill>
+            <a:schemeClr val="bg1"/>
+          </a:solidFill>
+          <a:ln>
+            <a:noFill/>
+          </a:ln>
+        </p:spPr>
+        <p:style>
+          <a:lnRef idx="2">
+            <a:schemeClr val="accent1">
+              <a:shade val="50000"/>
+            </a:schemeClr>
+          </a:lnRef>
+          <a:fillRef idx="1">
+            <a:schemeClr val="accent1"/>
+          </a:fillRef>
+          <a:effectRef idx="0">
+            <a:schemeClr val="accent1"/>
+          </a:effectRef>
+          <a:fontRef idx="minor">
+            <a:schemeClr val="lt1"/>
+          </a:fontRef>
+        </p:style>
+        <p:txBody>
+          <a:bodyPr rtlCol="0" anchor="ctr"/>
+          <a:lstStyle/>
+          <a:p>
+            <a:r>
+              <a:rPr lang="de-DE" sz="2800" dirty="0">
+                <a:solidFill>
+                  <a:schemeClr val="tx1"/>
+                </a:solidFill>
+              </a:rPr>
+              <a:t>Toolkits</a:t>
+            </a:r>
+          </a:p>
+        </p:txBody>
+      </p:sp>
+      <p:sp>
+        <p:nvSpPr>
+          <p:cNvPr id="20" name="Rechteck 19">
+            <a:extLst>
+              <a:ext uri="{FF2B5EF4-FFF2-40B4-BE49-F238E27FC236}">
+                <a16:creationId xmlns:a16="http://schemas.microsoft.com/office/drawing/2014/main" id="{EC644AE3-78D8-4994-8DDD-74EC2779CEDE}"/>
+              </a:ext>
+            </a:extLst>
+          </p:cNvPr>
+          <p:cNvSpPr/>
+          <p:nvPr/>
+        </p:nvSpPr>
+        <p:spPr>
+          <a:xfrm>
+            <a:off x="167898" y="1310380"/>
+            <a:ext cx="11906569" cy="5383931"/>
+          </a:xfrm>
+          <a:prstGeom prst="rect">
+            <a:avLst/>
+          </a:prstGeom>
+          <a:solidFill>
+            <a:schemeClr val="bg1"/>
+          </a:solidFill>
+          <a:ln>
+            <a:noFill/>
+          </a:ln>
+        </p:spPr>
+        <p:style>
+          <a:lnRef idx="2">
+            <a:schemeClr val="accent1">
+              <a:shade val="50000"/>
+            </a:schemeClr>
+          </a:lnRef>
+          <a:fillRef idx="1">
+            <a:schemeClr val="accent1"/>
+          </a:fillRef>
+          <a:effectRef idx="0">
+            <a:schemeClr val="accent1"/>
+          </a:effectRef>
+          <a:fontRef idx="minor">
+            <a:schemeClr val="lt1"/>
+          </a:fontRef>
+        </p:style>
+        <p:txBody>
+          <a:bodyPr numCol="1" rtlCol="0" anchor="ctr"/>
+          <a:lstStyle/>
+          <a:p>
+            <a:endParaRPr lang="de-DE" dirty="0">
+              <a:solidFill>
+                <a:schemeClr val="tx1"/>
+              </a:solidFill>
+            </a:endParaRPr>
+          </a:p>
+        </p:txBody>
+      </p:sp>
+      <p:cxnSp>
+        <p:nvCxnSpPr>
+          <p:cNvPr id="25" name="Gerader Verbinder 24">
+            <a:extLst>
+              <a:ext uri="{FF2B5EF4-FFF2-40B4-BE49-F238E27FC236}">
+                <a16:creationId xmlns:a16="http://schemas.microsoft.com/office/drawing/2014/main" id="{2745E54D-A3BE-4F3D-827F-FAB536FE7F7C}"/>
+              </a:ext>
+            </a:extLst>
+          </p:cNvPr>
+          <p:cNvCxnSpPr>
+            <a:cxnSpLocks/>
+          </p:cNvCxnSpPr>
+          <p:nvPr/>
+        </p:nvCxnSpPr>
+        <p:spPr>
+          <a:xfrm>
+            <a:off x="167898" y="1354984"/>
+            <a:ext cx="11906569" cy="0"/>
+          </a:xfrm>
+          <a:prstGeom prst="line">
+            <a:avLst/>
+          </a:prstGeom>
+          <a:ln>
+            <a:solidFill>
+              <a:schemeClr val="tx1"/>
+            </a:solidFill>
+          </a:ln>
+        </p:spPr>
+        <p:style>
+          <a:lnRef idx="1">
+            <a:schemeClr val="accent1"/>
+          </a:lnRef>
+          <a:fillRef idx="0">
+            <a:schemeClr val="accent1"/>
+          </a:fillRef>
+          <a:effectRef idx="0">
+            <a:schemeClr val="accent1"/>
+          </a:effectRef>
+          <a:fontRef idx="minor">
+            <a:schemeClr val="tx1"/>
+          </a:fontRef>
+        </p:style>
+      </p:cxnSp>
+      <p:grpSp>
+        <p:nvGrpSpPr>
+          <p:cNvPr id="44" name="Gruppieren 43">
+            <a:extLst>
+              <a:ext uri="{FF2B5EF4-FFF2-40B4-BE49-F238E27FC236}">
+                <a16:creationId xmlns:a16="http://schemas.microsoft.com/office/drawing/2014/main" id="{8F0CED83-CA40-4808-8928-E3429D5E766B}"/>
+              </a:ext>
+            </a:extLst>
+          </p:cNvPr>
+          <p:cNvGrpSpPr/>
+          <p:nvPr/>
+        </p:nvGrpSpPr>
+        <p:grpSpPr>
+          <a:xfrm>
+            <a:off x="3451361" y="1536707"/>
+            <a:ext cx="5289278" cy="1864858"/>
+            <a:chOff x="3451361" y="1536707"/>
+            <a:chExt cx="5289278" cy="1864858"/>
+          </a:xfrm>
+        </p:grpSpPr>
+        <p:grpSp>
+          <p:nvGrpSpPr>
+            <p:cNvPr id="26" name="Gruppieren 25">
+              <a:extLst>
+                <a:ext uri="{FF2B5EF4-FFF2-40B4-BE49-F238E27FC236}">
+                  <a16:creationId xmlns:a16="http://schemas.microsoft.com/office/drawing/2014/main" id="{CB928448-8CE3-4D00-83E3-4A47ECEA28F7}"/>
+                </a:ext>
+              </a:extLst>
+            </p:cNvPr>
+            <p:cNvGrpSpPr/>
+            <p:nvPr/>
+          </p:nvGrpSpPr>
+          <p:grpSpPr>
+            <a:xfrm>
+              <a:off x="3451361" y="2070855"/>
+              <a:ext cx="5289278" cy="1330710"/>
+              <a:chOff x="5019561" y="1907016"/>
+              <a:chExt cx="5289278" cy="1330710"/>
+            </a:xfrm>
+          </p:grpSpPr>
+          <p:pic>
+            <p:nvPicPr>
+              <p:cNvPr id="6" name="Grafik 5">
+                <a:extLst>
+                  <a:ext uri="{FF2B5EF4-FFF2-40B4-BE49-F238E27FC236}">
+                    <a16:creationId xmlns:a16="http://schemas.microsoft.com/office/drawing/2014/main" id="{AA41E61D-06BE-43C5-8D97-D1EC32093046}"/>
+                  </a:ext>
+                </a:extLst>
+              </p:cNvPr>
+              <p:cNvPicPr>
+                <a:picLocks noChangeAspect="1"/>
+              </p:cNvPicPr>
+              <p:nvPr/>
+            </p:nvPicPr>
+            <p:blipFill>
+              <a:blip r:embed="rId7">
+                <a:extLst>
+                  <a:ext uri="{28A0092B-C50C-407E-A947-70E740481C1C}">
+                    <a14:useLocalDpi xmlns:a14="http://schemas.microsoft.com/office/drawing/2010/main" val="0"/>
+                  </a:ext>
+                </a:extLst>
+              </a:blip>
+              <a:stretch>
+                <a:fillRect/>
+              </a:stretch>
+            </p:blipFill>
+            <p:spPr>
+              <a:xfrm>
+                <a:off x="5019561" y="1907016"/>
+                <a:ext cx="1330710" cy="1330710"/>
+              </a:xfrm>
+              <a:prstGeom prst="rect">
+                <a:avLst/>
+              </a:prstGeom>
+            </p:spPr>
+          </p:pic>
+          <p:sp>
+            <p:nvSpPr>
+              <p:cNvPr id="41" name="Rechteck: abgerundete Ecken 40">
+                <a:extLst>
+                  <a:ext uri="{FF2B5EF4-FFF2-40B4-BE49-F238E27FC236}">
+                    <a16:creationId xmlns:a16="http://schemas.microsoft.com/office/drawing/2014/main" id="{F5B2BDC0-50E3-43FC-85B3-E889BACBB5DE}"/>
+                  </a:ext>
+                </a:extLst>
+              </p:cNvPr>
+              <p:cNvSpPr/>
+              <p:nvPr/>
+            </p:nvSpPr>
+            <p:spPr>
+              <a:xfrm>
+                <a:off x="6832824" y="2232713"/>
+                <a:ext cx="3476015" cy="679316"/>
+              </a:xfrm>
+              <a:prstGeom prst="roundRect">
+                <a:avLst/>
+              </a:prstGeom>
+              <a:blipFill dpi="0" rotWithShape="1">
+                <a:blip r:embed="rId8"/>
+                <a:srcRect/>
+                <a:stretch>
+                  <a:fillRect/>
+                </a:stretch>
+              </a:blipFill>
+              <a:ln>
+                <a:noFill/>
+              </a:ln>
+            </p:spPr>
+            <p:style>
+              <a:lnRef idx="2">
+                <a:schemeClr val="accent1">
+                  <a:shade val="50000"/>
+                </a:schemeClr>
+              </a:lnRef>
+              <a:fillRef idx="1">
+                <a:schemeClr val="accent1"/>
+              </a:fillRef>
+              <a:effectRef idx="0">
+                <a:schemeClr val="accent1"/>
+              </a:effectRef>
+              <a:fontRef idx="minor">
+                <a:schemeClr val="lt1"/>
+              </a:fontRef>
+            </p:style>
+            <p:txBody>
+              <a:bodyPr rtlCol="0" anchor="ctr"/>
+              <a:lstStyle/>
+              <a:p>
+                <a:pPr algn="ctr"/>
+                <a:endParaRPr lang="de-DE" sz="2800" dirty="0"/>
+              </a:p>
+            </p:txBody>
+          </p:sp>
+        </p:grpSp>
+        <p:sp>
+          <p:nvSpPr>
+            <p:cNvPr id="22" name="Textfeld 21">
+              <a:extLst>
+                <a:ext uri="{FF2B5EF4-FFF2-40B4-BE49-F238E27FC236}">
+                  <a16:creationId xmlns:a16="http://schemas.microsoft.com/office/drawing/2014/main" id="{C20C9AEC-75DB-4D62-B641-361706987740}"/>
+                </a:ext>
+              </a:extLst>
+            </p:cNvPr>
+            <p:cNvSpPr txBox="1"/>
+            <p:nvPr/>
+          </p:nvSpPr>
+          <p:spPr>
+            <a:xfrm>
+              <a:off x="4730045" y="1536707"/>
+              <a:ext cx="2731911" cy="523220"/>
+            </a:xfrm>
+            <a:prstGeom prst="rect">
+              <a:avLst/>
+            </a:prstGeom>
+            <a:noFill/>
+          </p:spPr>
+          <p:txBody>
+            <a:bodyPr wrap="square" rtlCol="0">
+              <a:spAutoFit/>
+            </a:bodyPr>
+            <a:lstStyle/>
+            <a:p>
+              <a:pPr algn="ctr"/>
+              <a:r>
+                <a:rPr lang="de-DE" sz="2800" dirty="0"/>
+                <a:t>Frontend</a:t>
+              </a:r>
+            </a:p>
+          </p:txBody>
+        </p:sp>
+      </p:grpSp>
+      <p:grpSp>
+        <p:nvGrpSpPr>
+          <p:cNvPr id="46" name="Gruppieren 45">
+            <a:extLst>
+              <a:ext uri="{FF2B5EF4-FFF2-40B4-BE49-F238E27FC236}">
+                <a16:creationId xmlns:a16="http://schemas.microsoft.com/office/drawing/2014/main" id="{927F849B-61F2-4C2A-8161-5A6FE220AF88}"/>
+              </a:ext>
+            </a:extLst>
+          </p:cNvPr>
+          <p:cNvGrpSpPr/>
+          <p:nvPr/>
+        </p:nvGrpSpPr>
+        <p:grpSpPr>
+          <a:xfrm>
+            <a:off x="1185491" y="4069315"/>
+            <a:ext cx="9821018" cy="2009297"/>
+            <a:chOff x="1185491" y="4069315"/>
+            <a:chExt cx="9821018" cy="2009297"/>
+          </a:xfrm>
+        </p:grpSpPr>
+        <p:grpSp>
+          <p:nvGrpSpPr>
+            <p:cNvPr id="45" name="Gruppieren 44">
+              <a:extLst>
+                <a:ext uri="{FF2B5EF4-FFF2-40B4-BE49-F238E27FC236}">
+                  <a16:creationId xmlns:a16="http://schemas.microsoft.com/office/drawing/2014/main" id="{EC64FD27-ACE0-4D81-A8B5-849B273377C3}"/>
+                </a:ext>
+              </a:extLst>
+            </p:cNvPr>
+            <p:cNvGrpSpPr/>
+            <p:nvPr/>
+          </p:nvGrpSpPr>
+          <p:grpSpPr>
+            <a:xfrm>
+              <a:off x="1185491" y="4592535"/>
+              <a:ext cx="9821018" cy="1486077"/>
+              <a:chOff x="941225" y="4592535"/>
+              <a:chExt cx="9821018" cy="1486077"/>
+            </a:xfrm>
+          </p:grpSpPr>
+          <p:pic>
+            <p:nvPicPr>
+              <p:cNvPr id="13" name="Grafik 12">
+                <a:extLst>
+                  <a:ext uri="{FF2B5EF4-FFF2-40B4-BE49-F238E27FC236}">
+                    <a16:creationId xmlns:a16="http://schemas.microsoft.com/office/drawing/2014/main" id="{A7787D28-488B-4FD4-AC14-3E2115B7D4F4}"/>
+                  </a:ext>
+                </a:extLst>
+              </p:cNvPr>
+              <p:cNvPicPr>
+                <a:picLocks noChangeAspect="1"/>
+              </p:cNvPicPr>
+              <p:nvPr/>
+            </p:nvPicPr>
+            <p:blipFill>
+              <a:blip r:embed="rId9">
+                <a:extLst>
+                  <a:ext uri="{28A0092B-C50C-407E-A947-70E740481C1C}">
+                    <a14:useLocalDpi xmlns:a14="http://schemas.microsoft.com/office/drawing/2010/main" val="0"/>
+                  </a:ext>
+                </a:extLst>
+              </a:blip>
+              <a:stretch>
+                <a:fillRect/>
+              </a:stretch>
+            </p:blipFill>
+            <p:spPr>
+              <a:xfrm>
+                <a:off x="941225" y="4739903"/>
+                <a:ext cx="2188625" cy="1338709"/>
+              </a:xfrm>
+              <a:prstGeom prst="rect">
+                <a:avLst/>
+              </a:prstGeom>
+            </p:spPr>
+          </p:pic>
+          <p:pic>
+            <p:nvPicPr>
+              <p:cNvPr id="15" name="Grafik 14">
+                <a:extLst>
+                  <a:ext uri="{FF2B5EF4-FFF2-40B4-BE49-F238E27FC236}">
+                    <a16:creationId xmlns:a16="http://schemas.microsoft.com/office/drawing/2014/main" id="{07353223-BA0A-445F-90AA-5545DFDB05BB}"/>
+                  </a:ext>
+                </a:extLst>
+              </p:cNvPr>
+              <p:cNvPicPr>
+                <a:picLocks noChangeAspect="1"/>
+              </p:cNvPicPr>
+              <p:nvPr/>
+            </p:nvPicPr>
+            <p:blipFill>
+              <a:blip r:embed="rId10">
+                <a:extLst>
+                  <a:ext uri="{28A0092B-C50C-407E-A947-70E740481C1C}">
+                    <a14:useLocalDpi xmlns:a14="http://schemas.microsoft.com/office/drawing/2010/main" val="0"/>
+                  </a:ext>
+                </a:extLst>
+              </a:blip>
+              <a:stretch>
+                <a:fillRect/>
+              </a:stretch>
+            </p:blipFill>
+            <p:spPr>
+              <a:xfrm>
+                <a:off x="8190823" y="4592535"/>
+                <a:ext cx="2571420" cy="1330710"/>
+              </a:xfrm>
+              <a:prstGeom prst="rect">
+                <a:avLst/>
+              </a:prstGeom>
+            </p:spPr>
+          </p:pic>
+          <p:pic>
+            <p:nvPicPr>
+              <p:cNvPr id="21" name="Grafik 20">
+                <a:extLst>
+                  <a:ext uri="{FF2B5EF4-FFF2-40B4-BE49-F238E27FC236}">
+                    <a16:creationId xmlns:a16="http://schemas.microsoft.com/office/drawing/2014/main" id="{035548D0-FF84-4D4E-BF2B-51CD62792A3F}"/>
+                  </a:ext>
+                </a:extLst>
+              </p:cNvPr>
+              <p:cNvPicPr>
+                <a:picLocks noChangeAspect="1"/>
+              </p:cNvPicPr>
+              <p:nvPr/>
+            </p:nvPicPr>
+            <p:blipFill>
+              <a:blip r:embed="rId11"/>
+              <a:stretch>
+                <a:fillRect/>
+              </a:stretch>
+            </p:blipFill>
+            <p:spPr>
+              <a:xfrm>
+                <a:off x="3451361" y="4738975"/>
+                <a:ext cx="4417951" cy="1339637"/>
+              </a:xfrm>
+              <a:prstGeom prst="rect">
+                <a:avLst/>
+              </a:prstGeom>
+            </p:spPr>
+          </p:pic>
+        </p:grpSp>
+        <p:sp>
+          <p:nvSpPr>
+            <p:cNvPr id="43" name="Textfeld 42">
+              <a:extLst>
+                <a:ext uri="{FF2B5EF4-FFF2-40B4-BE49-F238E27FC236}">
+                  <a16:creationId xmlns:a16="http://schemas.microsoft.com/office/drawing/2014/main" id="{DEE59AD9-3A6A-4D06-8966-DC214C97DC01}"/>
+                </a:ext>
+              </a:extLst>
+            </p:cNvPr>
+            <p:cNvSpPr txBox="1"/>
+            <p:nvPr/>
+          </p:nvSpPr>
+          <p:spPr>
+            <a:xfrm>
+              <a:off x="4730045" y="4069315"/>
+              <a:ext cx="2731911" cy="523220"/>
+            </a:xfrm>
+            <a:prstGeom prst="rect">
+              <a:avLst/>
+            </a:prstGeom>
+            <a:noFill/>
+          </p:spPr>
+          <p:txBody>
+            <a:bodyPr wrap="square" rtlCol="0">
+              <a:spAutoFit/>
+            </a:bodyPr>
+            <a:lstStyle/>
+            <a:p>
+              <a:pPr algn="ctr"/>
+              <a:r>
+                <a:rPr lang="de-DE" sz="2800" dirty="0"/>
+                <a:t>Backend</a:t>
+              </a:r>
+            </a:p>
+          </p:txBody>
+        </p:sp>
+      </p:grpSp>
+    </p:spTree>
+    <p:extLst>
+      <p:ext uri="{BB962C8B-B14F-4D97-AF65-F5344CB8AC3E}">
+        <p14:creationId xmlns:p14="http://schemas.microsoft.com/office/powerpoint/2010/main" val="2164965558"/>
+      </p:ext>
+    </p:extLst>
+  </p:cSld>
+  <p:clrMapOvr>
+    <a:masterClrMapping/>
+  </p:clrMapOvr>
+  <mc:AlternateContent xmlns:mc="http://schemas.openxmlformats.org/markup-compatibility/2006">
+    <mc:Choice xmlns:p14="http://schemas.microsoft.com/office/powerpoint/2010/main" Requires="p14">
+      <p:transition p14:dur="10" advClick="0"/>
+    </mc:Choice>
+    <mc:Fallback>
       <p:transition advClick="0"/>
     </mc:Fallback>
   </mc:AlternateContent>

</xml_diff>